<commit_message>
Add text for buttons, add page numbers
Format code snippte on in the RGB Matrix slide
</commit_message>
<xml_diff>
--- a/CAOS Match4 Presentation.pptx
+++ b/CAOS Match4 Presentation.pptx
@@ -1067,7 +1067,7 @@
             </a:lvl1pPr>
           </a:lstStyle>
           <a:p>
-            <a:fld id="{48CCBFF0-7823-427F-A222-F3E3655F5915}" type="datetimeFigureOut">
+            <a:fld id="{5173B38C-9AFC-4D6F-80B3-F74E0F2EE84D}" type="datetime1">
               <a:rPr lang="de-DE" smtClean="0"/>
               <a:t>27.01.2019</a:t>
             </a:fld>
@@ -2154,7 +2154,7 @@
           <a:bodyPr/>
           <a:lstStyle/>
           <a:p>
-            <a:fld id="{48CCBFF0-7823-427F-A222-F3E3655F5915}" type="datetimeFigureOut">
+            <a:fld id="{0746C2FB-C39B-4BE1-932D-1BD8991947EE}" type="datetime1">
               <a:rPr lang="de-DE" smtClean="0"/>
               <a:t>27.01.2019</a:t>
             </a:fld>
@@ -3134,7 +3134,7 @@
           <a:bodyPr/>
           <a:lstStyle/>
           <a:p>
-            <a:fld id="{48CCBFF0-7823-427F-A222-F3E3655F5915}" type="datetimeFigureOut">
+            <a:fld id="{C03D66E2-A8B1-4B18-AD3F-F945A8814C00}" type="datetime1">
               <a:rPr lang="de-DE" smtClean="0"/>
               <a:t>27.01.2019</a:t>
             </a:fld>
@@ -4268,7 +4268,7 @@
           <a:bodyPr/>
           <a:lstStyle/>
           <a:p>
-            <a:fld id="{48CCBFF0-7823-427F-A222-F3E3655F5915}" type="datetimeFigureOut">
+            <a:fld id="{1246971B-1D81-4700-9604-8A567E65B323}" type="datetime1">
               <a:rPr lang="de-DE" smtClean="0"/>
               <a:t>27.01.2019</a:t>
             </a:fld>
@@ -5301,7 +5301,7 @@
           <a:bodyPr/>
           <a:lstStyle/>
           <a:p>
-            <a:fld id="{48CCBFF0-7823-427F-A222-F3E3655F5915}" type="datetimeFigureOut">
+            <a:fld id="{AA39A0DB-B621-4872-80B5-029A29B51E32}" type="datetime1">
               <a:rPr lang="de-DE" smtClean="0"/>
               <a:t>27.01.2019</a:t>
             </a:fld>
@@ -5961,7 +5961,7 @@
           <a:bodyPr/>
           <a:lstStyle/>
           <a:p>
-            <a:fld id="{48CCBFF0-7823-427F-A222-F3E3655F5915}" type="datetimeFigureOut">
+            <a:fld id="{A3776A68-24D4-42BA-88DE-576683FA9037}" type="datetime1">
               <a:rPr lang="de-DE" smtClean="0"/>
               <a:t>27.01.2019</a:t>
             </a:fld>
@@ -6819,7 +6819,7 @@
           <a:bodyPr/>
           <a:lstStyle/>
           <a:p>
-            <a:fld id="{48CCBFF0-7823-427F-A222-F3E3655F5915}" type="datetimeFigureOut">
+            <a:fld id="{94C529AE-B79F-46C6-944F-44ED1152E67D}" type="datetime1">
               <a:rPr lang="de-DE" smtClean="0"/>
               <a:t>27.01.2019</a:t>
             </a:fld>
@@ -7009,7 +7009,7 @@
           <a:bodyPr/>
           <a:lstStyle/>
           <a:p>
-            <a:fld id="{48CCBFF0-7823-427F-A222-F3E3655F5915}" type="datetimeFigureOut">
+            <a:fld id="{70450EFA-0AB7-4C63-B27F-E2F2224820F1}" type="datetime1">
               <a:rPr lang="de-DE" smtClean="0"/>
               <a:t>27.01.2019</a:t>
             </a:fld>
@@ -7981,7 +7981,7 @@
           <a:bodyPr/>
           <a:lstStyle/>
           <a:p>
-            <a:fld id="{48CCBFF0-7823-427F-A222-F3E3655F5915}" type="datetimeFigureOut">
+            <a:fld id="{8495FFE3-76A2-4572-A654-216EB4DEFCC7}" type="datetime1">
               <a:rPr lang="de-DE" smtClean="0"/>
               <a:t>27.01.2019</a:t>
             </a:fld>
@@ -8192,7 +8192,7 @@
           <a:bodyPr/>
           <a:lstStyle/>
           <a:p>
-            <a:fld id="{48CCBFF0-7823-427F-A222-F3E3655F5915}" type="datetimeFigureOut">
+            <a:fld id="{DF235956-54D7-4F3F-8B1B-749580B12754}" type="datetime1">
               <a:rPr lang="de-DE" smtClean="0"/>
               <a:t>27.01.2019</a:t>
             </a:fld>
@@ -9226,7 +9226,7 @@
           <a:bodyPr/>
           <a:lstStyle/>
           <a:p>
-            <a:fld id="{48CCBFF0-7823-427F-A222-F3E3655F5915}" type="datetimeFigureOut">
+            <a:fld id="{F8C0A1DA-30E5-4F80-8EF1-825618AF54EE}" type="datetime1">
               <a:rPr lang="de-DE" smtClean="0"/>
               <a:t>27.01.2019</a:t>
             </a:fld>
@@ -9498,7 +9498,7 @@
           <a:bodyPr/>
           <a:lstStyle/>
           <a:p>
-            <a:fld id="{48CCBFF0-7823-427F-A222-F3E3655F5915}" type="datetimeFigureOut">
+            <a:fld id="{ADA921F6-143C-42C9-83A7-4FEE8AD0ADEE}" type="datetime1">
               <a:rPr lang="de-DE" smtClean="0"/>
               <a:t>27.01.2019</a:t>
             </a:fld>
@@ -9908,7 +9908,7 @@
           <a:bodyPr/>
           <a:lstStyle/>
           <a:p>
-            <a:fld id="{48CCBFF0-7823-427F-A222-F3E3655F5915}" type="datetimeFigureOut">
+            <a:fld id="{59304F0B-DA7E-4E5C-B941-DFC861471FA9}" type="datetime1">
               <a:rPr lang="de-DE" smtClean="0"/>
               <a:t>27.01.2019</a:t>
             </a:fld>
@@ -10035,7 +10035,7 @@
           <a:bodyPr/>
           <a:lstStyle/>
           <a:p>
-            <a:fld id="{48CCBFF0-7823-427F-A222-F3E3655F5915}" type="datetimeFigureOut">
+            <a:fld id="{0D328C41-C82B-479A-85D2-3BFD2C54412B}" type="datetime1">
               <a:rPr lang="de-DE" smtClean="0"/>
               <a:t>27.01.2019</a:t>
             </a:fld>
@@ -10130,7 +10130,7 @@
           <a:bodyPr/>
           <a:lstStyle/>
           <a:p>
-            <a:fld id="{48CCBFF0-7823-427F-A222-F3E3655F5915}" type="datetimeFigureOut">
+            <a:fld id="{99FEE1D5-B929-49D9-A9C5-EE8239120E86}" type="datetime1">
               <a:rPr lang="de-DE" smtClean="0"/>
               <a:t>27.01.2019</a:t>
             </a:fld>
@@ -11211,7 +11211,7 @@
           <a:bodyPr/>
           <a:lstStyle/>
           <a:p>
-            <a:fld id="{48CCBFF0-7823-427F-A222-F3E3655F5915}" type="datetimeFigureOut">
+            <a:fld id="{A390E5F9-9BE9-46FD-807F-F885E6213D6B}" type="datetime1">
               <a:rPr lang="de-DE" smtClean="0"/>
               <a:t>27.01.2019</a:t>
             </a:fld>
@@ -12318,7 +12318,7 @@
           <a:bodyPr/>
           <a:lstStyle/>
           <a:p>
-            <a:fld id="{48CCBFF0-7823-427F-A222-F3E3655F5915}" type="datetimeFigureOut">
+            <a:fld id="{06A7E8FE-EEA0-4A2F-8BBB-7C935B8173CD}" type="datetime1">
               <a:rPr lang="de-DE" smtClean="0"/>
               <a:t>27.01.2019</a:t>
             </a:fld>
@@ -13315,7 +13315,7 @@
             </a:lvl1pPr>
           </a:lstStyle>
           <a:p>
-            <a:fld id="{48CCBFF0-7823-427F-A222-F3E3655F5915}" type="datetimeFigureOut">
+            <a:fld id="{661B0241-AD09-4D65-8A6E-C923FAA7C8AE}" type="datetime1">
               <a:rPr lang="de-DE" smtClean="0"/>
               <a:t>27.01.2019</a:t>
             </a:fld>
@@ -13460,6 +13460,7 @@
     <p:sldLayoutId id="2147483676" r:id="rId16"/>
     <p:sldLayoutId id="2147483677" r:id="rId17"/>
   </p:sldLayoutIdLst>
+  <p:hf hdr="0" ftr="0" dt="0"/>
   <p:txStyles>
     <p:titleStyle>
       <a:lvl1pPr algn="l" defTabSz="457200" rtl="0" eaLnBrk="1" latinLnBrk="0" hangingPunct="1">
@@ -13932,6 +13933,35 @@
           </a:p>
         </p:txBody>
       </p:sp>
+      <p:sp>
+        <p:nvSpPr>
+          <p:cNvPr id="5" name="Slide Number Placeholder 4">
+            <a:extLst>
+              <a:ext uri="{FF2B5EF4-FFF2-40B4-BE49-F238E27FC236}">
+                <a16:creationId xmlns:a16="http://schemas.microsoft.com/office/drawing/2014/main" id="{C11B353F-53FF-4CCE-A5DB-7FA8FCF0C003}"/>
+              </a:ext>
+            </a:extLst>
+          </p:cNvPr>
+          <p:cNvSpPr>
+            <a:spLocks noGrp="1"/>
+          </p:cNvSpPr>
+          <p:nvPr>
+            <p:ph type="sldNum" sz="quarter" idx="12"/>
+          </p:nvPr>
+        </p:nvSpPr>
+        <p:spPr/>
+        <p:txBody>
+          <a:bodyPr/>
+          <a:lstStyle/>
+          <a:p>
+            <a:fld id="{156C34C3-9C0B-4AD0-A6C1-A92CD3A8269C}" type="slidenum">
+              <a:rPr lang="de-DE" smtClean="0"/>
+              <a:t>1</a:t>
+            </a:fld>
+            <a:endParaRPr lang="de-DE" dirty="0"/>
+          </a:p>
+        </p:txBody>
+      </p:sp>
     </p:spTree>
     <p:extLst>
       <p:ext uri="{BB962C8B-B14F-4D97-AF65-F5344CB8AC3E}">
@@ -13970,6 +14000,53 @@
           <a:chExt cx="0" cy="0"/>
         </a:xfrm>
       </p:grpSpPr>
+      <p:pic>
+        <p:nvPicPr>
+          <p:cNvPr id="1026" name="Picture 2">
+            <a:extLst>
+              <a:ext uri="{FF2B5EF4-FFF2-40B4-BE49-F238E27FC236}">
+                <a16:creationId xmlns:a16="http://schemas.microsoft.com/office/drawing/2014/main" id="{97D22180-361C-4012-9150-C89BEF20F881}"/>
+              </a:ext>
+            </a:extLst>
+          </p:cNvPr>
+          <p:cNvPicPr>
+            <a:picLocks noGrp="1" noChangeAspect="1" noChangeArrowheads="1"/>
+          </p:cNvPicPr>
+          <p:nvPr>
+            <p:ph idx="1"/>
+          </p:nvPr>
+        </p:nvPicPr>
+        <p:blipFill rotWithShape="1">
+          <a:blip r:embed="rId2">
+            <a:extLst>
+              <a:ext uri="{28A0092B-C50C-407E-A947-70E740481C1C}">
+                <a14:useLocalDpi xmlns:a14="http://schemas.microsoft.com/office/drawing/2010/main" val="0"/>
+              </a:ext>
+            </a:extLst>
+          </a:blip>
+          <a:srcRect/>
+          <a:stretch/>
+        </p:blipFill>
+        <p:spPr bwMode="auto">
+          <a:xfrm>
+            <a:off x="20" y="10"/>
+            <a:ext cx="12191980" cy="6857990"/>
+          </a:xfrm>
+          <a:prstGeom prst="rect">
+            <a:avLst/>
+          </a:prstGeom>
+          <a:noFill/>
+          <a:extLst>
+            <a:ext uri="{909E8E84-426E-40DD-AFC4-6F175D3DCCD1}">
+              <a14:hiddenFill xmlns:a14="http://schemas.microsoft.com/office/drawing/2010/main">
+                <a:solidFill>
+                  <a:srgbClr val="FFFFFF"/>
+                </a:solidFill>
+              </a14:hiddenFill>
+            </a:ext>
+          </a:extLst>
+        </p:spPr>
+      </p:pic>
       <p:sp>
         <p:nvSpPr>
           <p:cNvPr id="71" name="Rectangle 70">
@@ -14023,53 +14100,35 @@
           </a:fontRef>
         </p:style>
       </p:sp>
-      <p:pic>
-        <p:nvPicPr>
-          <p:cNvPr id="1026" name="Picture 2">
+      <p:sp>
+        <p:nvSpPr>
+          <p:cNvPr id="2" name="Slide Number Placeholder 1">
             <a:extLst>
               <a:ext uri="{FF2B5EF4-FFF2-40B4-BE49-F238E27FC236}">
-                <a16:creationId xmlns:a16="http://schemas.microsoft.com/office/drawing/2014/main" id="{97D22180-361C-4012-9150-C89BEF20F881}"/>
+                <a16:creationId xmlns:a16="http://schemas.microsoft.com/office/drawing/2014/main" id="{E50AC423-818C-4F9C-9E13-55EC6BF936CD}"/>
               </a:ext>
             </a:extLst>
           </p:cNvPr>
-          <p:cNvPicPr>
-            <a:picLocks noGrp="1" noChangeAspect="1" noChangeArrowheads="1"/>
-          </p:cNvPicPr>
+          <p:cNvSpPr>
+            <a:spLocks noGrp="1"/>
+          </p:cNvSpPr>
           <p:nvPr>
-            <p:ph idx="1"/>
+            <p:ph type="sldNum" sz="quarter" idx="12"/>
           </p:nvPr>
-        </p:nvPicPr>
-        <p:blipFill rotWithShape="1">
-          <a:blip r:embed="rId2">
-            <a:extLst>
-              <a:ext uri="{28A0092B-C50C-407E-A947-70E740481C1C}">
-                <a14:useLocalDpi xmlns:a14="http://schemas.microsoft.com/office/drawing/2010/main" val="0"/>
-              </a:ext>
-            </a:extLst>
-          </a:blip>
-          <a:srcRect/>
-          <a:stretch/>
-        </p:blipFill>
-        <p:spPr bwMode="auto">
-          <a:xfrm>
-            <a:off x="20" y="10"/>
-            <a:ext cx="12191980" cy="6857990"/>
-          </a:xfrm>
-          <a:prstGeom prst="rect">
-            <a:avLst/>
-          </a:prstGeom>
-          <a:noFill/>
-          <a:extLst>
-            <a:ext uri="{909E8E84-426E-40DD-AFC4-6F175D3DCCD1}">
-              <a14:hiddenFill xmlns:a14="http://schemas.microsoft.com/office/drawing/2010/main">
-                <a:solidFill>
-                  <a:srgbClr val="FFFFFF"/>
-                </a:solidFill>
-              </a14:hiddenFill>
-            </a:ext>
-          </a:extLst>
-        </p:spPr>
-      </p:pic>
+        </p:nvSpPr>
+        <p:spPr/>
+        <p:txBody>
+          <a:bodyPr/>
+          <a:lstStyle/>
+          <a:p>
+            <a:fld id="{156C34C3-9C0B-4AD0-A6C1-A92CD3A8269C}" type="slidenum">
+              <a:rPr lang="de-DE" smtClean="0"/>
+              <a:t>10</a:t>
+            </a:fld>
+            <a:endParaRPr lang="de-DE" dirty="0"/>
+          </a:p>
+        </p:txBody>
+      </p:sp>
     </p:spTree>
     <p:extLst>
       <p:ext uri="{BB962C8B-B14F-4D97-AF65-F5344CB8AC3E}">
@@ -14874,7 +14933,10 @@
           </a:bodyPr>
           <a:lstStyle/>
           <a:p>
-            <a:endParaRPr lang="en-US" dirty="0"/>
+            <a:r>
+              <a:rPr lang="en-US" dirty="0"/>
+              <a:t>Schematics</a:t>
+            </a:r>
           </a:p>
         </p:txBody>
       </p:sp>
@@ -14906,21 +14968,27 @@
           </a:bodyPr>
           <a:lstStyle/>
           <a:p>
-            <a:endParaRPr lang="en-US" dirty="0">
-              <a:solidFill>
-                <a:schemeClr val="bg1"/>
-              </a:solidFill>
-            </a:endParaRPr>
-          </a:p>
-          <a:p>
+            <a:pPr marL="0" indent="0">
+              <a:buNone/>
+            </a:pPr>
             <a:r>
               <a:rPr lang="en-US" dirty="0">
                 <a:solidFill>
                   <a:schemeClr val="bg1"/>
                 </a:solidFill>
               </a:rPr>
-              <a:t>The Arduino is on the left</a:t>
+              <a:t>Connection from the Arduino to the LED Matrix</a:t>
             </a:r>
+          </a:p>
+          <a:p>
+            <a:pPr marL="0" indent="0">
+              <a:buNone/>
+            </a:pPr>
+            <a:endParaRPr lang="en-US" dirty="0">
+              <a:solidFill>
+                <a:schemeClr val="bg1"/>
+              </a:solidFill>
+            </a:endParaRPr>
           </a:p>
           <a:p>
             <a:r>
@@ -14929,11 +14997,63 @@
                   <a:schemeClr val="bg1"/>
                 </a:solidFill>
               </a:rPr>
-              <a:t>The LED Matrix is on the right</a:t>
+              <a:t>Arduino on the left</a:t>
+            </a:r>
+          </a:p>
+          <a:p>
+            <a:r>
+              <a:rPr lang="en-US" dirty="0">
+                <a:solidFill>
+                  <a:schemeClr val="bg1"/>
+                </a:solidFill>
+              </a:rPr>
+              <a:t>LED Matrix on the right</a:t>
             </a:r>
           </a:p>
         </p:txBody>
       </p:sp>
+      <p:pic>
+        <p:nvPicPr>
+          <p:cNvPr id="20" name="Picture 19">
+            <a:extLst>
+              <a:ext uri="{FF2B5EF4-FFF2-40B4-BE49-F238E27FC236}">
+                <a16:creationId xmlns:a16="http://schemas.microsoft.com/office/drawing/2014/main" id="{D995FFC8-0FA3-49E7-B9E0-C3E37644BCAF}"/>
+              </a:ext>
+            </a:extLst>
+          </p:cNvPr>
+          <p:cNvPicPr/>
+          <p:nvPr/>
+        </p:nvPicPr>
+        <p:blipFill rotWithShape="1">
+          <a:blip r:embed="rId3" cstate="print">
+            <a:extLst>
+              <a:ext uri="{28A0092B-C50C-407E-A947-70E740481C1C}">
+                <a14:useLocalDpi xmlns:a14="http://schemas.microsoft.com/office/drawing/2010/main" val="0"/>
+              </a:ext>
+            </a:extLst>
+          </a:blip>
+          <a:srcRect t="5444"/>
+          <a:stretch/>
+        </p:blipFill>
+        <p:spPr bwMode="auto">
+          <a:xfrm>
+            <a:off x="5488168" y="661735"/>
+            <a:ext cx="6280498" cy="5534528"/>
+          </a:xfrm>
+          <a:prstGeom prst="rect">
+            <a:avLst/>
+          </a:prstGeom>
+          <a:noFill/>
+          <a:ln>
+            <a:noFill/>
+          </a:ln>
+          <a:extLst>
+            <a:ext uri="{53640926-AAD7-44D8-BBD7-CCE9431645EC}">
+              <a14:shadowObscured xmlns:a14="http://schemas.microsoft.com/office/drawing/2010/main"/>
+            </a:ext>
+          </a:extLst>
+        </p:spPr>
+      </p:pic>
       <p:sp>
         <p:nvSpPr>
           <p:cNvPr id="21" name="Rectangle 20">
@@ -14987,48 +15107,35 @@
           </a:fontRef>
         </p:style>
       </p:sp>
-      <p:pic>
-        <p:nvPicPr>
-          <p:cNvPr id="20" name="Picture 19">
+      <p:sp>
+        <p:nvSpPr>
+          <p:cNvPr id="3" name="Slide Number Placeholder 2">
             <a:extLst>
               <a:ext uri="{FF2B5EF4-FFF2-40B4-BE49-F238E27FC236}">
-                <a16:creationId xmlns:a16="http://schemas.microsoft.com/office/drawing/2014/main" id="{D995FFC8-0FA3-49E7-B9E0-C3E37644BCAF}"/>
+                <a16:creationId xmlns:a16="http://schemas.microsoft.com/office/drawing/2014/main" id="{3B54D18B-BB50-464B-9537-12B8BFF4D562}"/>
               </a:ext>
             </a:extLst>
           </p:cNvPr>
-          <p:cNvPicPr/>
-          <p:nvPr/>
-        </p:nvPicPr>
-        <p:blipFill rotWithShape="1">
-          <a:blip r:embed="rId3" cstate="print">
-            <a:extLst>
-              <a:ext uri="{28A0092B-C50C-407E-A947-70E740481C1C}">
-                <a14:useLocalDpi xmlns:a14="http://schemas.microsoft.com/office/drawing/2010/main" val="0"/>
-              </a:ext>
-            </a:extLst>
-          </a:blip>
-          <a:srcRect t="5444"/>
-          <a:stretch/>
-        </p:blipFill>
-        <p:spPr bwMode="auto">
-          <a:xfrm>
-            <a:off x="5488168" y="661735"/>
-            <a:ext cx="6280498" cy="5534528"/>
-          </a:xfrm>
-          <a:prstGeom prst="rect">
-            <a:avLst/>
-          </a:prstGeom>
-          <a:noFill/>
-          <a:ln>
-            <a:noFill/>
-          </a:ln>
-          <a:extLst>
-            <a:ext uri="{53640926-AAD7-44D8-BBD7-CCE9431645EC}">
-              <a14:shadowObscured xmlns:a14="http://schemas.microsoft.com/office/drawing/2010/main"/>
-            </a:ext>
-          </a:extLst>
-        </p:spPr>
-      </p:pic>
+          <p:cNvSpPr>
+            <a:spLocks noGrp="1"/>
+          </p:cNvSpPr>
+          <p:nvPr>
+            <p:ph type="sldNum" sz="quarter" idx="12"/>
+          </p:nvPr>
+        </p:nvSpPr>
+        <p:spPr/>
+        <p:txBody>
+          <a:bodyPr/>
+          <a:lstStyle/>
+          <a:p>
+            <a:fld id="{156C34C3-9C0B-4AD0-A6C1-A92CD3A8269C}" type="slidenum">
+              <a:rPr lang="de-DE" smtClean="0"/>
+              <a:t>11</a:t>
+            </a:fld>
+            <a:endParaRPr lang="de-DE" dirty="0"/>
+          </a:p>
+        </p:txBody>
+      </p:sp>
     </p:spTree>
     <p:extLst>
       <p:ext uri="{BB962C8B-B14F-4D97-AF65-F5344CB8AC3E}">
@@ -15110,16 +15217,59 @@
           <a:p>
             <a:r>
               <a:rPr lang="en-US" dirty="0"/>
-              <a:t>Buttons work slightly differently than the buttons we experimented with during the CAOS </a:t>
+              <a:t>Buttons work slightly differently than the buttons we experimented with during the CAOS exercises:</a:t>
             </a:r>
+          </a:p>
+          <a:p>
             <a:r>
-              <a:rPr lang="en-US" dirty="0" err="1"/>
-              <a:t>excercises</a:t>
+              <a:rPr lang="en-US" dirty="0"/>
+              <a:t>Only two pins</a:t>
             </a:r>
+          </a:p>
+          <a:p>
+            <a:r>
+              <a:rPr lang="en-US" dirty="0"/>
+              <a:t>Connected to analog pins</a:t>
+            </a:r>
+          </a:p>
+          <a:p>
+            <a:pPr lvl="1"/>
+            <a:r>
+              <a:rPr lang="en-US" dirty="0"/>
+              <a:t>(no other pins free)</a:t>
+            </a:r>
+          </a:p>
+          <a:p>
             <a:endParaRPr lang="en-US" dirty="0"/>
           </a:p>
-          <a:p>
-            <a:endParaRPr lang="en-US" dirty="0"/>
+        </p:txBody>
+      </p:sp>
+      <p:sp>
+        <p:nvSpPr>
+          <p:cNvPr id="4" name="Slide Number Placeholder 3">
+            <a:extLst>
+              <a:ext uri="{FF2B5EF4-FFF2-40B4-BE49-F238E27FC236}">
+                <a16:creationId xmlns:a16="http://schemas.microsoft.com/office/drawing/2014/main" id="{3D6F679A-F735-4731-AA8F-14D3F76C562E}"/>
+              </a:ext>
+            </a:extLst>
+          </p:cNvPr>
+          <p:cNvSpPr>
+            <a:spLocks noGrp="1"/>
+          </p:cNvSpPr>
+          <p:nvPr>
+            <p:ph type="sldNum" sz="quarter" idx="12"/>
+          </p:nvPr>
+        </p:nvSpPr>
+        <p:spPr/>
+        <p:txBody>
+          <a:bodyPr/>
+          <a:lstStyle/>
+          <a:p>
+            <a:fld id="{156C34C3-9C0B-4AD0-A6C1-A92CD3A8269C}" type="slidenum">
+              <a:rPr lang="de-DE" smtClean="0"/>
+              <a:t>12</a:t>
+            </a:fld>
+            <a:endParaRPr lang="de-DE" dirty="0"/>
           </a:p>
         </p:txBody>
       </p:sp>
@@ -15999,53 +16149,117 @@
               </a:rPr>
               <a:t>Code Example: </a:t>
             </a:r>
-            <a:r>
-              <a:rPr lang="en-US" dirty="0" err="1">
-                <a:solidFill>
-                  <a:srgbClr val="FFFFFF"/>
-                </a:solidFill>
-              </a:rPr>
-              <a:t>drawPixel</a:t>
-            </a:r>
-            <a:r>
+            <a:br>
               <a:rPr lang="en-US" dirty="0">
                 <a:solidFill>
                   <a:srgbClr val="FFFFFF"/>
                 </a:solidFill>
               </a:rPr>
-              <a:t>(</a:t>
-            </a:r>
-            <a:r>
-              <a:rPr lang="en-US" dirty="0" err="1">
-                <a:solidFill>
-                  <a:srgbClr val="FFFFFF"/>
-                </a:solidFill>
-              </a:rPr>
-              <a:t>xPosition</a:t>
-            </a:r>
-            <a:r>
+            </a:br>
+            <a:br>
               <a:rPr lang="en-US" dirty="0">
                 <a:solidFill>
                   <a:srgbClr val="FFFFFF"/>
                 </a:solidFill>
               </a:rPr>
-              <a:t>, </a:t>
-            </a:r>
+            </a:br>
             <a:r>
-              <a:rPr lang="en-US" dirty="0" err="1">
+              <a:rPr lang="en-US" sz="1600" dirty="0" err="1">
                 <a:solidFill>
                   <a:srgbClr val="FFFFFF"/>
                 </a:solidFill>
+                <a:latin typeface="Courier New" panose="02070309020205020404" pitchFamily="49" charset="0"/>
+                <a:cs typeface="Courier New" panose="02070309020205020404" pitchFamily="49" charset="0"/>
+              </a:rPr>
+              <a:t>drawPixel</a:t>
+            </a:r>
+            <a:r>
+              <a:rPr lang="en-US" sz="1600" dirty="0">
+                <a:solidFill>
+                  <a:srgbClr val="FFFFFF"/>
+                </a:solidFill>
+                <a:latin typeface="Courier New" panose="02070309020205020404" pitchFamily="49" charset="0"/>
+                <a:cs typeface="Courier New" panose="02070309020205020404" pitchFamily="49" charset="0"/>
+              </a:rPr>
+              <a:t>(</a:t>
+            </a:r>
+            <a:br>
+              <a:rPr lang="en-US" sz="1600" dirty="0">
+                <a:solidFill>
+                  <a:srgbClr val="FFFFFF"/>
+                </a:solidFill>
+                <a:latin typeface="Courier New" panose="02070309020205020404" pitchFamily="49" charset="0"/>
+                <a:cs typeface="Courier New" panose="02070309020205020404" pitchFamily="49" charset="0"/>
+              </a:rPr>
+            </a:br>
+            <a:r>
+              <a:rPr lang="en-US" sz="1600" dirty="0">
+                <a:solidFill>
+                  <a:srgbClr val="FFFFFF"/>
+                </a:solidFill>
+                <a:latin typeface="Courier New" panose="02070309020205020404" pitchFamily="49" charset="0"/>
+                <a:cs typeface="Courier New" panose="02070309020205020404" pitchFamily="49" charset="0"/>
+              </a:rPr>
+              <a:t>		</a:t>
+            </a:r>
+            <a:r>
+              <a:rPr lang="en-US" sz="1600" dirty="0" err="1">
+                <a:solidFill>
+                  <a:srgbClr val="FFFFFF"/>
+                </a:solidFill>
+                <a:latin typeface="Courier New" panose="02070309020205020404" pitchFamily="49" charset="0"/>
+                <a:cs typeface="Courier New" panose="02070309020205020404" pitchFamily="49" charset="0"/>
+              </a:rPr>
+              <a:t>xPosition</a:t>
+            </a:r>
+            <a:r>
+              <a:rPr lang="en-US" sz="1600" dirty="0">
+                <a:solidFill>
+                  <a:srgbClr val="FFFFFF"/>
+                </a:solidFill>
+                <a:latin typeface="Courier New" panose="02070309020205020404" pitchFamily="49" charset="0"/>
+                <a:cs typeface="Courier New" panose="02070309020205020404" pitchFamily="49" charset="0"/>
+              </a:rPr>
+              <a:t>, 				</a:t>
+            </a:r>
+            <a:r>
+              <a:rPr lang="en-US" sz="1600" dirty="0" err="1">
+                <a:solidFill>
+                  <a:srgbClr val="FFFFFF"/>
+                </a:solidFill>
+                <a:latin typeface="Courier New" panose="02070309020205020404" pitchFamily="49" charset="0"/>
+                <a:cs typeface="Courier New" panose="02070309020205020404" pitchFamily="49" charset="0"/>
               </a:rPr>
               <a:t>yPosition</a:t>
             </a:r>
             <a:r>
-              <a:rPr lang="en-US" dirty="0">
+              <a:rPr lang="en-US" sz="1600" dirty="0">
                 <a:solidFill>
                   <a:srgbClr val="FFFFFF"/>
                 </a:solidFill>
+                <a:latin typeface="Courier New" panose="02070309020205020404" pitchFamily="49" charset="0"/>
+                <a:cs typeface="Courier New" panose="02070309020205020404" pitchFamily="49" charset="0"/>
               </a:rPr>
-              <a:t>, R, G, B)</a:t>
+              <a:t>,</a:t>
+            </a:r>
+            <a:br>
+              <a:rPr lang="en-US" sz="1600" dirty="0">
+                <a:solidFill>
+                  <a:srgbClr val="FFFFFF"/>
+                </a:solidFill>
+                <a:latin typeface="Courier New" panose="02070309020205020404" pitchFamily="49" charset="0"/>
+                <a:cs typeface="Courier New" panose="02070309020205020404" pitchFamily="49" charset="0"/>
+              </a:rPr>
+            </a:br>
+            <a:r>
+              <a:rPr lang="en-US" sz="1600" dirty="0">
+                <a:solidFill>
+                  <a:srgbClr val="FFFFFF"/>
+                </a:solidFill>
+                <a:latin typeface="Courier New" panose="02070309020205020404" pitchFamily="49" charset="0"/>
+                <a:cs typeface="Courier New" panose="02070309020205020404" pitchFamily="49" charset="0"/>
+              </a:rPr>
+              <a:t>		RGB);</a:t>
             </a:r>
           </a:p>
           <a:p>
@@ -16414,28 +16628,12 @@
               <a:buNone/>
             </a:pPr>
             <a:r>
-              <a:rPr lang="en-US" dirty="0" err="1">
-                <a:solidFill>
-                  <a:srgbClr val="FFFFFF"/>
-                </a:solidFill>
-              </a:rPr>
-              <a:t>f</a:t>
-            </a:r>
-            <a:r>
-              <a:rPr lang="en-US" dirty="0" err="1">
-                <a:solidFill>
-                  <a:schemeClr val="tx1"/>
-                </a:solidFill>
-              </a:rPr>
-              <a:t>X</a:t>
-            </a:r>
-            <a:r>
               <a:rPr lang="en-US" dirty="0">
                 <a:solidFill>
                   <a:schemeClr val="tx1"/>
                 </a:solidFill>
               </a:rPr>
-              <a:t>=0,Y=0</a:t>
+              <a:t>X=0,Y=0</a:t>
             </a:r>
           </a:p>
         </p:txBody>
@@ -16490,6 +16688,35 @@
                 <a:sysClr val="windowText" lastClr="000000"/>
               </a:solidFill>
             </a:endParaRPr>
+          </a:p>
+        </p:txBody>
+      </p:sp>
+      <p:sp>
+        <p:nvSpPr>
+          <p:cNvPr id="4" name="Slide Number Placeholder 3">
+            <a:extLst>
+              <a:ext uri="{FF2B5EF4-FFF2-40B4-BE49-F238E27FC236}">
+                <a16:creationId xmlns:a16="http://schemas.microsoft.com/office/drawing/2014/main" id="{72F27732-63C2-4D90-AF44-614B0E985FBE}"/>
+              </a:ext>
+            </a:extLst>
+          </p:cNvPr>
+          <p:cNvSpPr>
+            <a:spLocks noGrp="1"/>
+          </p:cNvSpPr>
+          <p:nvPr>
+            <p:ph type="sldNum" sz="quarter" idx="12"/>
+          </p:nvPr>
+        </p:nvSpPr>
+        <p:spPr/>
+        <p:txBody>
+          <a:bodyPr/>
+          <a:lstStyle/>
+          <a:p>
+            <a:fld id="{156C34C3-9C0B-4AD0-A6C1-A92CD3A8269C}" type="slidenum">
+              <a:rPr lang="de-DE" smtClean="0"/>
+              <a:t>13</a:t>
+            </a:fld>
+            <a:endParaRPr lang="de-DE" dirty="0"/>
           </a:p>
         </p:txBody>
       </p:sp>
@@ -16608,6 +16835,35 @@
               <a:rPr lang="en-US" dirty="0"/>
               <a:t>A lot of time/effort wasted rewriting the code</a:t>
             </a:r>
+          </a:p>
+        </p:txBody>
+      </p:sp>
+      <p:sp>
+        <p:nvSpPr>
+          <p:cNvPr id="4" name="Slide Number Placeholder 3">
+            <a:extLst>
+              <a:ext uri="{FF2B5EF4-FFF2-40B4-BE49-F238E27FC236}">
+                <a16:creationId xmlns:a16="http://schemas.microsoft.com/office/drawing/2014/main" id="{0B3090AE-4DDA-43C4-8D51-F45B8F973DA4}"/>
+              </a:ext>
+            </a:extLst>
+          </p:cNvPr>
+          <p:cNvSpPr>
+            <a:spLocks noGrp="1"/>
+          </p:cNvSpPr>
+          <p:nvPr>
+            <p:ph type="sldNum" sz="quarter" idx="12"/>
+          </p:nvPr>
+        </p:nvSpPr>
+        <p:spPr/>
+        <p:txBody>
+          <a:bodyPr/>
+          <a:lstStyle/>
+          <a:p>
+            <a:fld id="{156C34C3-9C0B-4AD0-A6C1-A92CD3A8269C}" type="slidenum">
+              <a:rPr lang="de-DE" smtClean="0"/>
+              <a:t>14</a:t>
+            </a:fld>
+            <a:endParaRPr lang="de-DE" dirty="0"/>
           </a:p>
         </p:txBody>
       </p:sp>
@@ -16699,6 +16955,35 @@
           </a:p>
         </p:txBody>
       </p:sp>
+      <p:sp>
+        <p:nvSpPr>
+          <p:cNvPr id="3" name="Slide Number Placeholder 2">
+            <a:extLst>
+              <a:ext uri="{FF2B5EF4-FFF2-40B4-BE49-F238E27FC236}">
+                <a16:creationId xmlns:a16="http://schemas.microsoft.com/office/drawing/2014/main" id="{9C265856-C9FC-4B4C-A571-8143876C0017}"/>
+              </a:ext>
+            </a:extLst>
+          </p:cNvPr>
+          <p:cNvSpPr>
+            <a:spLocks noGrp="1"/>
+          </p:cNvSpPr>
+          <p:nvPr>
+            <p:ph type="sldNum" sz="quarter" idx="12"/>
+          </p:nvPr>
+        </p:nvSpPr>
+        <p:spPr/>
+        <p:txBody>
+          <a:bodyPr/>
+          <a:lstStyle/>
+          <a:p>
+            <a:fld id="{156C34C3-9C0B-4AD0-A6C1-A92CD3A8269C}" type="slidenum">
+              <a:rPr lang="de-DE" smtClean="0"/>
+              <a:t>15</a:t>
+            </a:fld>
+            <a:endParaRPr lang="de-DE" dirty="0"/>
+          </a:p>
+        </p:txBody>
+      </p:sp>
     </p:spTree>
     <p:extLst>
       <p:ext uri="{BB962C8B-B14F-4D97-AF65-F5344CB8AC3E}">
@@ -16780,6 +17065,35 @@
           <a:lstStyle/>
           <a:p>
             <a:endParaRPr lang="en-US" dirty="0"/>
+          </a:p>
+        </p:txBody>
+      </p:sp>
+      <p:sp>
+        <p:nvSpPr>
+          <p:cNvPr id="2" name="Slide Number Placeholder 1">
+            <a:extLst>
+              <a:ext uri="{FF2B5EF4-FFF2-40B4-BE49-F238E27FC236}">
+                <a16:creationId xmlns:a16="http://schemas.microsoft.com/office/drawing/2014/main" id="{BB456E3A-818E-41A9-9E1C-DF99CFCA76AB}"/>
+              </a:ext>
+            </a:extLst>
+          </p:cNvPr>
+          <p:cNvSpPr>
+            <a:spLocks noGrp="1"/>
+          </p:cNvSpPr>
+          <p:nvPr>
+            <p:ph type="sldNum" sz="quarter" idx="12"/>
+          </p:nvPr>
+        </p:nvSpPr>
+        <p:spPr/>
+        <p:txBody>
+          <a:bodyPr/>
+          <a:lstStyle/>
+          <a:p>
+            <a:fld id="{156C34C3-9C0B-4AD0-A6C1-A92CD3A8269C}" type="slidenum">
+              <a:rPr lang="de-DE" smtClean="0"/>
+              <a:t>16</a:t>
+            </a:fld>
+            <a:endParaRPr lang="de-DE" dirty="0"/>
           </a:p>
         </p:txBody>
       </p:sp>
@@ -16939,6 +17253,35 @@
           </a:p>
         </p:txBody>
       </p:sp>
+      <p:sp>
+        <p:nvSpPr>
+          <p:cNvPr id="4" name="Slide Number Placeholder 3">
+            <a:extLst>
+              <a:ext uri="{FF2B5EF4-FFF2-40B4-BE49-F238E27FC236}">
+                <a16:creationId xmlns:a16="http://schemas.microsoft.com/office/drawing/2014/main" id="{340373BC-971C-433E-A26D-3429A0BEF453}"/>
+              </a:ext>
+            </a:extLst>
+          </p:cNvPr>
+          <p:cNvSpPr>
+            <a:spLocks noGrp="1"/>
+          </p:cNvSpPr>
+          <p:nvPr>
+            <p:ph type="sldNum" sz="quarter" idx="12"/>
+          </p:nvPr>
+        </p:nvSpPr>
+        <p:spPr/>
+        <p:txBody>
+          <a:bodyPr/>
+          <a:lstStyle/>
+          <a:p>
+            <a:fld id="{156C34C3-9C0B-4AD0-A6C1-A92CD3A8269C}" type="slidenum">
+              <a:rPr lang="de-DE" smtClean="0"/>
+              <a:t>17</a:t>
+            </a:fld>
+            <a:endParaRPr lang="de-DE" dirty="0"/>
+          </a:p>
+        </p:txBody>
+      </p:sp>
     </p:spTree>
     <p:extLst>
       <p:ext uri="{BB962C8B-B14F-4D97-AF65-F5344CB8AC3E}">
@@ -17043,6 +17386,35 @@
           </a:p>
           <a:p>
             <a:endParaRPr lang="en-US" dirty="0"/>
+          </a:p>
+        </p:txBody>
+      </p:sp>
+      <p:sp>
+        <p:nvSpPr>
+          <p:cNvPr id="4" name="Slide Number Placeholder 3">
+            <a:extLst>
+              <a:ext uri="{FF2B5EF4-FFF2-40B4-BE49-F238E27FC236}">
+                <a16:creationId xmlns:a16="http://schemas.microsoft.com/office/drawing/2014/main" id="{5D11997F-BC30-4E1B-AED5-E6FDA72225BB}"/>
+              </a:ext>
+            </a:extLst>
+          </p:cNvPr>
+          <p:cNvSpPr>
+            <a:spLocks noGrp="1"/>
+          </p:cNvSpPr>
+          <p:nvPr>
+            <p:ph type="sldNum" sz="quarter" idx="12"/>
+          </p:nvPr>
+        </p:nvSpPr>
+        <p:spPr/>
+        <p:txBody>
+          <a:bodyPr/>
+          <a:lstStyle/>
+          <a:p>
+            <a:fld id="{156C34C3-9C0B-4AD0-A6C1-A92CD3A8269C}" type="slidenum">
+              <a:rPr lang="de-DE" smtClean="0"/>
+              <a:t>18</a:t>
+            </a:fld>
+            <a:endParaRPr lang="de-DE" dirty="0"/>
           </a:p>
         </p:txBody>
       </p:sp>
@@ -17127,6 +17499,35 @@
           <a:lstStyle/>
           <a:p>
             <a:endParaRPr lang="en-US" dirty="0"/>
+          </a:p>
+        </p:txBody>
+      </p:sp>
+      <p:sp>
+        <p:nvSpPr>
+          <p:cNvPr id="2" name="Slide Number Placeholder 1">
+            <a:extLst>
+              <a:ext uri="{FF2B5EF4-FFF2-40B4-BE49-F238E27FC236}">
+                <a16:creationId xmlns:a16="http://schemas.microsoft.com/office/drawing/2014/main" id="{1140D7B9-22DE-41D3-8B43-DB098E68984F}"/>
+              </a:ext>
+            </a:extLst>
+          </p:cNvPr>
+          <p:cNvSpPr>
+            <a:spLocks noGrp="1"/>
+          </p:cNvSpPr>
+          <p:nvPr>
+            <p:ph type="sldNum" sz="quarter" idx="12"/>
+          </p:nvPr>
+        </p:nvSpPr>
+        <p:spPr/>
+        <p:txBody>
+          <a:bodyPr/>
+          <a:lstStyle/>
+          <a:p>
+            <a:fld id="{156C34C3-9C0B-4AD0-A6C1-A92CD3A8269C}" type="slidenum">
+              <a:rPr lang="de-DE" smtClean="0"/>
+              <a:t>19</a:t>
+            </a:fld>
+            <a:endParaRPr lang="de-DE" dirty="0"/>
           </a:p>
         </p:txBody>
       </p:sp>
@@ -17337,6 +17738,35 @@
           </a:extLst>
         </p:spPr>
       </p:pic>
+      <p:sp>
+        <p:nvSpPr>
+          <p:cNvPr id="4" name="Slide Number Placeholder 3">
+            <a:extLst>
+              <a:ext uri="{FF2B5EF4-FFF2-40B4-BE49-F238E27FC236}">
+                <a16:creationId xmlns:a16="http://schemas.microsoft.com/office/drawing/2014/main" id="{FF3C94A1-1940-448F-AD13-407D3A3A85B0}"/>
+              </a:ext>
+            </a:extLst>
+          </p:cNvPr>
+          <p:cNvSpPr>
+            <a:spLocks noGrp="1"/>
+          </p:cNvSpPr>
+          <p:nvPr>
+            <p:ph type="sldNum" sz="quarter" idx="12"/>
+          </p:nvPr>
+        </p:nvSpPr>
+        <p:spPr/>
+        <p:txBody>
+          <a:bodyPr/>
+          <a:lstStyle/>
+          <a:p>
+            <a:fld id="{156C34C3-9C0B-4AD0-A6C1-A92CD3A8269C}" type="slidenum">
+              <a:rPr lang="de-DE" smtClean="0"/>
+              <a:t>2</a:t>
+            </a:fld>
+            <a:endParaRPr lang="de-DE" dirty="0"/>
+          </a:p>
+        </p:txBody>
+      </p:sp>
     </p:spTree>
     <p:extLst>
       <p:ext uri="{BB962C8B-B14F-4D97-AF65-F5344CB8AC3E}">
@@ -17557,6 +17987,35 @@
           </a:extLst>
         </p:spPr>
       </p:pic>
+      <p:sp>
+        <p:nvSpPr>
+          <p:cNvPr id="4" name="Slide Number Placeholder 3">
+            <a:extLst>
+              <a:ext uri="{FF2B5EF4-FFF2-40B4-BE49-F238E27FC236}">
+                <a16:creationId xmlns:a16="http://schemas.microsoft.com/office/drawing/2014/main" id="{EBB34484-3364-4E6F-9C44-9DC26C3816B8}"/>
+              </a:ext>
+            </a:extLst>
+          </p:cNvPr>
+          <p:cNvSpPr>
+            <a:spLocks noGrp="1"/>
+          </p:cNvSpPr>
+          <p:nvPr>
+            <p:ph type="sldNum" sz="quarter" idx="12"/>
+          </p:nvPr>
+        </p:nvSpPr>
+        <p:spPr/>
+        <p:txBody>
+          <a:bodyPr/>
+          <a:lstStyle/>
+          <a:p>
+            <a:fld id="{156C34C3-9C0B-4AD0-A6C1-A92CD3A8269C}" type="slidenum">
+              <a:rPr lang="de-DE" smtClean="0"/>
+              <a:t>3</a:t>
+            </a:fld>
+            <a:endParaRPr lang="de-DE" dirty="0"/>
+          </a:p>
+        </p:txBody>
+      </p:sp>
     </p:spTree>
     <p:extLst>
       <p:ext uri="{BB962C8B-B14F-4D97-AF65-F5344CB8AC3E}">
@@ -17710,6 +18169,35 @@
               <a:rPr lang="en-US" dirty="0"/>
               <a:t>Goal: Project finished before 2019 starts</a:t>
             </a:r>
+          </a:p>
+        </p:txBody>
+      </p:sp>
+      <p:sp>
+        <p:nvSpPr>
+          <p:cNvPr id="4" name="Slide Number Placeholder 3">
+            <a:extLst>
+              <a:ext uri="{FF2B5EF4-FFF2-40B4-BE49-F238E27FC236}">
+                <a16:creationId xmlns:a16="http://schemas.microsoft.com/office/drawing/2014/main" id="{A68CC443-0A65-4241-B615-D04EAF8984A3}"/>
+              </a:ext>
+            </a:extLst>
+          </p:cNvPr>
+          <p:cNvSpPr>
+            <a:spLocks noGrp="1"/>
+          </p:cNvSpPr>
+          <p:nvPr>
+            <p:ph type="sldNum" sz="quarter" idx="12"/>
+          </p:nvPr>
+        </p:nvSpPr>
+        <p:spPr/>
+        <p:txBody>
+          <a:bodyPr/>
+          <a:lstStyle/>
+          <a:p>
+            <a:fld id="{156C34C3-9C0B-4AD0-A6C1-A92CD3A8269C}" type="slidenum">
+              <a:rPr lang="de-DE" smtClean="0"/>
+              <a:t>4</a:t>
+            </a:fld>
+            <a:endParaRPr lang="de-DE" dirty="0"/>
           </a:p>
         </p:txBody>
       </p:sp>
@@ -17817,6 +18305,35 @@
           </a:p>
         </p:txBody>
       </p:sp>
+      <p:sp>
+        <p:nvSpPr>
+          <p:cNvPr id="4" name="Slide Number Placeholder 3">
+            <a:extLst>
+              <a:ext uri="{FF2B5EF4-FFF2-40B4-BE49-F238E27FC236}">
+                <a16:creationId xmlns:a16="http://schemas.microsoft.com/office/drawing/2014/main" id="{344499A0-E661-4F61-9997-004FE3A6B5F0}"/>
+              </a:ext>
+            </a:extLst>
+          </p:cNvPr>
+          <p:cNvSpPr>
+            <a:spLocks noGrp="1"/>
+          </p:cNvSpPr>
+          <p:nvPr>
+            <p:ph type="sldNum" sz="quarter" idx="12"/>
+          </p:nvPr>
+        </p:nvSpPr>
+        <p:spPr/>
+        <p:txBody>
+          <a:bodyPr/>
+          <a:lstStyle/>
+          <a:p>
+            <a:fld id="{156C34C3-9C0B-4AD0-A6C1-A92CD3A8269C}" type="slidenum">
+              <a:rPr lang="de-DE" smtClean="0"/>
+              <a:t>5</a:t>
+            </a:fld>
+            <a:endParaRPr lang="de-DE" dirty="0"/>
+          </a:p>
+        </p:txBody>
+      </p:sp>
     </p:spTree>
     <p:extLst>
       <p:ext uri="{BB962C8B-B14F-4D97-AF65-F5344CB8AC3E}">
@@ -17940,6 +18457,35 @@
               <a:rPr lang="en-US" dirty="0"/>
               <a:t>Not enough Ports on the Arduino to connect the 7 buttons, had to make it work with just 3</a:t>
             </a:r>
+          </a:p>
+        </p:txBody>
+      </p:sp>
+      <p:sp>
+        <p:nvSpPr>
+          <p:cNvPr id="4" name="Slide Number Placeholder 3">
+            <a:extLst>
+              <a:ext uri="{FF2B5EF4-FFF2-40B4-BE49-F238E27FC236}">
+                <a16:creationId xmlns:a16="http://schemas.microsoft.com/office/drawing/2014/main" id="{19D73313-DD7A-49BA-BD57-7FB0CD6A3BF4}"/>
+              </a:ext>
+            </a:extLst>
+          </p:cNvPr>
+          <p:cNvSpPr>
+            <a:spLocks noGrp="1"/>
+          </p:cNvSpPr>
+          <p:nvPr>
+            <p:ph type="sldNum" sz="quarter" idx="12"/>
+          </p:nvPr>
+        </p:nvSpPr>
+        <p:spPr/>
+        <p:txBody>
+          <a:bodyPr/>
+          <a:lstStyle/>
+          <a:p>
+            <a:fld id="{156C34C3-9C0B-4AD0-A6C1-A92CD3A8269C}" type="slidenum">
+              <a:rPr lang="de-DE" smtClean="0"/>
+              <a:t>6</a:t>
+            </a:fld>
+            <a:endParaRPr lang="de-DE" dirty="0"/>
           </a:p>
         </p:txBody>
       </p:sp>
@@ -18568,6 +19114,43 @@
           </a:p>
         </p:txBody>
       </p:sp>
+      <p:sp>
+        <p:nvSpPr>
+          <p:cNvPr id="3" name="Slide Number Placeholder 2">
+            <a:extLst>
+              <a:ext uri="{FF2B5EF4-FFF2-40B4-BE49-F238E27FC236}">
+                <a16:creationId xmlns:a16="http://schemas.microsoft.com/office/drawing/2014/main" id="{BB0CC44A-EBE5-4B32-BAD0-CFEE3DB43D32}"/>
+              </a:ext>
+            </a:extLst>
+          </p:cNvPr>
+          <p:cNvSpPr>
+            <a:spLocks noGrp="1"/>
+          </p:cNvSpPr>
+          <p:nvPr>
+            <p:ph type="sldNum" sz="quarter" idx="12"/>
+          </p:nvPr>
+        </p:nvSpPr>
+        <p:spPr/>
+        <p:txBody>
+          <a:bodyPr/>
+          <a:lstStyle/>
+          <a:p>
+            <a:fld id="{156C34C3-9C0B-4AD0-A6C1-A92CD3A8269C}" type="slidenum">
+              <a:rPr lang="de-DE" smtClean="0">
+                <a:solidFill>
+                  <a:schemeClr val="tx1"/>
+                </a:solidFill>
+              </a:rPr>
+              <a:t>7</a:t>
+            </a:fld>
+            <a:endParaRPr lang="de-DE" dirty="0">
+              <a:solidFill>
+                <a:schemeClr val="tx1"/>
+              </a:solidFill>
+            </a:endParaRPr>
+          </a:p>
+        </p:txBody>
+      </p:sp>
     </p:spTree>
     <p:extLst>
       <p:ext uri="{BB962C8B-B14F-4D97-AF65-F5344CB8AC3E}">
@@ -19078,6 +19661,43 @@
           </a:extLst>
         </p:spPr>
       </p:pic>
+      <p:sp>
+        <p:nvSpPr>
+          <p:cNvPr id="3" name="Slide Number Placeholder 2">
+            <a:extLst>
+              <a:ext uri="{FF2B5EF4-FFF2-40B4-BE49-F238E27FC236}">
+                <a16:creationId xmlns:a16="http://schemas.microsoft.com/office/drawing/2014/main" id="{19772D05-A671-4BAA-A059-ABEF9385BBCA}"/>
+              </a:ext>
+            </a:extLst>
+          </p:cNvPr>
+          <p:cNvSpPr>
+            <a:spLocks noGrp="1"/>
+          </p:cNvSpPr>
+          <p:nvPr>
+            <p:ph type="sldNum" sz="quarter" idx="12"/>
+          </p:nvPr>
+        </p:nvSpPr>
+        <p:spPr/>
+        <p:txBody>
+          <a:bodyPr/>
+          <a:lstStyle/>
+          <a:p>
+            <a:fld id="{156C34C3-9C0B-4AD0-A6C1-A92CD3A8269C}" type="slidenum">
+              <a:rPr lang="de-DE" smtClean="0">
+                <a:solidFill>
+                  <a:schemeClr val="tx1"/>
+                </a:solidFill>
+              </a:rPr>
+              <a:t>8</a:t>
+            </a:fld>
+            <a:endParaRPr lang="de-DE" dirty="0">
+              <a:solidFill>
+                <a:schemeClr val="tx1"/>
+              </a:solidFill>
+            </a:endParaRPr>
+          </a:p>
+        </p:txBody>
+      </p:sp>
     </p:spTree>
     <p:extLst>
       <p:ext uri="{BB962C8B-B14F-4D97-AF65-F5344CB8AC3E}">
@@ -19116,6 +19736,53 @@
           <a:chExt cx="0" cy="0"/>
         </a:xfrm>
       </p:grpSpPr>
+      <p:pic>
+        <p:nvPicPr>
+          <p:cNvPr id="2050" name="Picture 2">
+            <a:extLst>
+              <a:ext uri="{FF2B5EF4-FFF2-40B4-BE49-F238E27FC236}">
+                <a16:creationId xmlns:a16="http://schemas.microsoft.com/office/drawing/2014/main" id="{1078D246-2088-4BE8-A31F-49B343AF1887}"/>
+              </a:ext>
+            </a:extLst>
+          </p:cNvPr>
+          <p:cNvPicPr>
+            <a:picLocks noGrp="1" noChangeAspect="1" noChangeArrowheads="1"/>
+          </p:cNvPicPr>
+          <p:nvPr>
+            <p:ph idx="1"/>
+          </p:nvPr>
+        </p:nvPicPr>
+        <p:blipFill rotWithShape="1">
+          <a:blip r:embed="rId2">
+            <a:extLst>
+              <a:ext uri="{28A0092B-C50C-407E-A947-70E740481C1C}">
+                <a14:useLocalDpi xmlns:a14="http://schemas.microsoft.com/office/drawing/2010/main" val="0"/>
+              </a:ext>
+            </a:extLst>
+          </a:blip>
+          <a:srcRect/>
+          <a:stretch/>
+        </p:blipFill>
+        <p:spPr bwMode="auto">
+          <a:xfrm>
+            <a:off x="20" y="10"/>
+            <a:ext cx="12191980" cy="6857990"/>
+          </a:xfrm>
+          <a:prstGeom prst="rect">
+            <a:avLst/>
+          </a:prstGeom>
+          <a:noFill/>
+          <a:extLst>
+            <a:ext uri="{909E8E84-426E-40DD-AFC4-6F175D3DCCD1}">
+              <a14:hiddenFill xmlns:a14="http://schemas.microsoft.com/office/drawing/2010/main">
+                <a:solidFill>
+                  <a:srgbClr val="FFFFFF"/>
+                </a:solidFill>
+              </a14:hiddenFill>
+            </a:ext>
+          </a:extLst>
+        </p:spPr>
+      </p:pic>
       <p:sp>
         <p:nvSpPr>
           <p:cNvPr id="71" name="Rectangle 70">
@@ -19169,53 +19836,35 @@
           </a:fontRef>
         </p:style>
       </p:sp>
-      <p:pic>
-        <p:nvPicPr>
-          <p:cNvPr id="2050" name="Picture 2">
+      <p:sp>
+        <p:nvSpPr>
+          <p:cNvPr id="2" name="Slide Number Placeholder 1">
             <a:extLst>
               <a:ext uri="{FF2B5EF4-FFF2-40B4-BE49-F238E27FC236}">
-                <a16:creationId xmlns:a16="http://schemas.microsoft.com/office/drawing/2014/main" id="{1078D246-2088-4BE8-A31F-49B343AF1887}"/>
+                <a16:creationId xmlns:a16="http://schemas.microsoft.com/office/drawing/2014/main" id="{0A3B071F-0FCC-4943-BA21-6C81F03962E4}"/>
               </a:ext>
             </a:extLst>
           </p:cNvPr>
-          <p:cNvPicPr>
-            <a:picLocks noGrp="1" noChangeAspect="1" noChangeArrowheads="1"/>
-          </p:cNvPicPr>
+          <p:cNvSpPr>
+            <a:spLocks noGrp="1"/>
+          </p:cNvSpPr>
           <p:nvPr>
-            <p:ph idx="1"/>
+            <p:ph type="sldNum" sz="quarter" idx="12"/>
           </p:nvPr>
-        </p:nvPicPr>
-        <p:blipFill rotWithShape="1">
-          <a:blip r:embed="rId2">
-            <a:extLst>
-              <a:ext uri="{28A0092B-C50C-407E-A947-70E740481C1C}">
-                <a14:useLocalDpi xmlns:a14="http://schemas.microsoft.com/office/drawing/2010/main" val="0"/>
-              </a:ext>
-            </a:extLst>
-          </a:blip>
-          <a:srcRect/>
-          <a:stretch/>
-        </p:blipFill>
-        <p:spPr bwMode="auto">
-          <a:xfrm>
-            <a:off x="20" y="10"/>
-            <a:ext cx="12191980" cy="6857990"/>
-          </a:xfrm>
-          <a:prstGeom prst="rect">
-            <a:avLst/>
-          </a:prstGeom>
-          <a:noFill/>
-          <a:extLst>
-            <a:ext uri="{909E8E84-426E-40DD-AFC4-6F175D3DCCD1}">
-              <a14:hiddenFill xmlns:a14="http://schemas.microsoft.com/office/drawing/2010/main">
-                <a:solidFill>
-                  <a:srgbClr val="FFFFFF"/>
-                </a:solidFill>
-              </a14:hiddenFill>
-            </a:ext>
-          </a:extLst>
-        </p:spPr>
-      </p:pic>
+        </p:nvSpPr>
+        <p:spPr/>
+        <p:txBody>
+          <a:bodyPr/>
+          <a:lstStyle/>
+          <a:p>
+            <a:fld id="{156C34C3-9C0B-4AD0-A6C1-A92CD3A8269C}" type="slidenum">
+              <a:rPr lang="de-DE" smtClean="0"/>
+              <a:t>9</a:t>
+            </a:fld>
+            <a:endParaRPr lang="de-DE" dirty="0"/>
+          </a:p>
+        </p:txBody>
+      </p:sp>
     </p:spTree>
     <p:extLst>
       <p:ext uri="{BB962C8B-B14F-4D97-AF65-F5344CB8AC3E}">

</xml_diff>